<commit_message>
Contagens by text, titles and some other things i dont really remember right now.
</commit_message>
<xml_diff>
--- a/Demonstracao/Slides.pptx
+++ b/Demonstracao/Slides.pptx
@@ -8078,7 +8078,7 @@
         </p:spPr>
         <p:txBody>
           <a:bodyPr spcFirstLastPara="1" wrap="square" lIns="91425" tIns="91425" rIns="91425" bIns="91425" anchor="t" anchorCtr="0">
-            <a:normAutofit fontScale="62500" lnSpcReduction="20000"/>
+            <a:normAutofit fontScale="85000" lnSpcReduction="20000"/>
           </a:bodyPr>
           <a:lstStyle/>
           <a:p>
@@ -8093,10 +8093,10 @@
               <a:buChar char="●"/>
             </a:pPr>
             <a:r>
-              <a:rPr lang="pt-PT" sz="3123" dirty="0"/>
+              <a:rPr lang="pt-PT" sz="2600" dirty="0"/>
               <a:t>Podemos afirmar que o projeto está a decorrer conforme o espectado. </a:t>
             </a:r>
-            <a:endParaRPr sz="3123" dirty="0"/>
+            <a:endParaRPr sz="2600" dirty="0"/>
           </a:p>
           <a:p>
             <a:pPr marL="457200" lvl="0" indent="-337679" algn="l" rtl="0">
@@ -8110,10 +8110,22 @@
               <a:buChar char="●"/>
             </a:pPr>
             <a:r>
-              <a:rPr lang="pt-PT" sz="3123" dirty="0"/>
-              <a:t>Foram planeados e analisados os vários elementos do sistema, a forma como eles devem ser construídos e quais as suas funções. </a:t>
+              <a:rPr lang="pt-PT" sz="2600" dirty="0"/>
+              <a:t>Foram planeados e analisados os vários elementos do sistema, a forma como eles devem ser </a:t>
             </a:r>
-            <a:endParaRPr sz="3123" dirty="0"/>
+            <a:r>
+              <a:rPr lang="pt-PT" sz="2600" dirty="0" smtClean="0"/>
+              <a:t>construídos, quais </a:t>
+            </a:r>
+            <a:r>
+              <a:rPr lang="pt-PT" sz="2600" dirty="0"/>
+              <a:t>as suas </a:t>
+            </a:r>
+            <a:r>
+              <a:rPr lang="pt-PT" sz="2600" dirty="0" smtClean="0"/>
+              <a:t>funções e as tecnologias e conceitos utilizados na sua implementação. </a:t>
+            </a:r>
+            <a:endParaRPr sz="2600" dirty="0"/>
           </a:p>
           <a:p>
             <a:pPr marL="457200" lvl="0" indent="-337679" algn="l" rtl="0">
@@ -8127,45 +8139,12 @@
               <a:buChar char="●"/>
             </a:pPr>
             <a:r>
-              <a:rPr lang="pt-PT" sz="3123" dirty="0"/>
-              <a:t>Debatemos as várias tecnologias e conceitos que vamos utilizar na implementação desta solução. </a:t>
-            </a:r>
-            <a:endParaRPr sz="3123" dirty="0"/>
-          </a:p>
-          <a:p>
-            <a:pPr marL="0" lvl="0" indent="0" algn="l" rtl="0">
-              <a:spcBef>
-                <a:spcPts val="0"/>
-              </a:spcBef>
-              <a:spcAft>
-                <a:spcPts val="0"/>
-              </a:spcAft>
-              <a:buNone/>
-            </a:pPr>
-            <a:endParaRPr sz="3123" dirty="0"/>
-          </a:p>
-          <a:p>
-            <a:pPr marL="457200" lvl="0" indent="-337679" algn="l" rtl="0">
-              <a:spcBef>
-                <a:spcPts val="0"/>
-              </a:spcBef>
-              <a:spcAft>
-                <a:spcPts val="0"/>
-              </a:spcAft>
-              <a:buSzPct val="100000"/>
-              <a:buChar char="●"/>
-            </a:pPr>
-            <a:r>
-              <a:rPr lang="pt-PT" sz="3123" dirty="0"/>
-              <a:t>Já começámos a utilizar a ferramenta escolhida para o desenvolvimento da componente de software do projeto e já </a:t>
+              <a:rPr lang="pt-PT" sz="2600" dirty="0" smtClean="0"/>
+              <a:t>O desenvolvimento dos elementos do sistema já se encontra perto da sua conclusão, restando apenas finalizar os testes, finalizar alguns ecrãs da aplicação móvel e melhorar o OCR</a:t>
             </a:r>
             <a:r>
               <a:rPr lang="pt-PT" sz="3123" dirty="0" smtClean="0"/>
-              <a:t>implementámos o </a:t>
-            </a:r>
-            <a:r>
-              <a:rPr lang="pt-PT" sz="3123" dirty="0"/>
-              <a:t>modelo de dados e a autenticação dos utilizadores.</a:t>
+              <a:t>.</a:t>
             </a:r>
             <a:endParaRPr sz="3123" dirty="0"/>
           </a:p>

</xml_diff>